<commit_message>
week4 day3 and day4 workshop
</commit_message>
<xml_diff>
--- a/week2/Week3Demo.pptx
+++ b/week2/Week3Demo.pptx
@@ -1375,6 +1375,396 @@
           </a:bodyPr>
           <a:lstStyle/>
           <a:p>
+            <a:endParaRPr lang="en-US" altLang="zh-CN" sz="1100" b="0" i="0" u="none" strike="noStrike" cap="none" dirty="0">
+              <a:solidFill>
+                <a:srgbClr val="000000"/>
+              </a:solidFill>
+              <a:effectLst/>
+              <a:latin typeface="Arial"/>
+              <a:ea typeface="Arial"/>
+              <a:cs typeface="Arial"/>
+              <a:sym typeface="Arial"/>
+            </a:endParaRPr>
+          </a:p>
+          <a:p>
+            <a:pPr marL="139700" indent="0">
+              <a:buNone/>
+            </a:pPr>
+            <a:r>
+              <a:rPr lang="en-US" altLang="zh-CN" sz="1100" b="0" i="0" u="none" strike="noStrike" cap="none" dirty="0">
+                <a:solidFill>
+                  <a:srgbClr val="000000"/>
+                </a:solidFill>
+                <a:effectLst/>
+                <a:latin typeface="Arial"/>
+                <a:ea typeface="Arial"/>
+                <a:cs typeface="Arial"/>
+                <a:sym typeface="Arial"/>
+              </a:rPr>
+              <a:t>The query here is to manipulate this array with generic type, what it going to do here is to order the array itself by </a:t>
+            </a:r>
+            <a:r>
+              <a:rPr lang="en-US" altLang="zh-CN" sz="1100" b="0" i="0" u="none" strike="noStrike" cap="none" dirty="0" err="1">
+                <a:solidFill>
+                  <a:srgbClr val="000000"/>
+                </a:solidFill>
+                <a:effectLst/>
+                <a:latin typeface="Arial"/>
+                <a:ea typeface="Arial"/>
+                <a:cs typeface="Arial"/>
+                <a:sym typeface="Arial"/>
+              </a:rPr>
+              <a:t>desensing</a:t>
+            </a:r>
+            <a:r>
+              <a:rPr lang="en-US" altLang="zh-CN" sz="1100" b="0" i="0" u="none" strike="noStrike" cap="none" dirty="0">
+                <a:solidFill>
+                  <a:srgbClr val="000000"/>
+                </a:solidFill>
+                <a:effectLst/>
+                <a:latin typeface="Arial"/>
+                <a:ea typeface="Arial"/>
+                <a:cs typeface="Arial"/>
+                <a:sym typeface="Arial"/>
+              </a:rPr>
+              <a:t> </a:t>
+            </a:r>
+          </a:p>
+          <a:p>
+            <a:pPr marL="139700" indent="0">
+              <a:buNone/>
+            </a:pPr>
+            <a:r>
+              <a:rPr lang="en-US" altLang="zh-CN" sz="1100" b="0" i="0" u="none" strike="noStrike" cap="none" dirty="0">
+                <a:solidFill>
+                  <a:srgbClr val="000000"/>
+                </a:solidFill>
+                <a:effectLst/>
+                <a:latin typeface="Arial"/>
+                <a:ea typeface="Arial"/>
+                <a:cs typeface="Arial"/>
+                <a:sym typeface="Arial"/>
+              </a:rPr>
+              <a:t>From command is to </a:t>
+            </a:r>
+            <a:r>
+              <a:rPr lang="en-US" altLang="zh-CN" sz="1100" b="0" i="0" u="none" strike="noStrike" cap="none" dirty="0" err="1">
+                <a:solidFill>
+                  <a:srgbClr val="000000"/>
+                </a:solidFill>
+                <a:effectLst/>
+                <a:latin typeface="Arial"/>
+                <a:ea typeface="Arial"/>
+                <a:cs typeface="Arial"/>
+                <a:sym typeface="Arial"/>
+              </a:rPr>
+              <a:t>determin</a:t>
+            </a:r>
+            <a:r>
+              <a:rPr lang="en-US" altLang="zh-CN" sz="1100" b="0" i="0" u="none" strike="noStrike" cap="none" dirty="0">
+                <a:solidFill>
+                  <a:srgbClr val="000000"/>
+                </a:solidFill>
+                <a:effectLst/>
+                <a:latin typeface="Arial"/>
+                <a:ea typeface="Arial"/>
+                <a:cs typeface="Arial"/>
+                <a:sym typeface="Arial"/>
+              </a:rPr>
+              <a:t> where the </a:t>
+            </a:r>
+            <a:r>
+              <a:rPr lang="en-US" altLang="zh-CN" sz="1100" b="0" i="0" u="none" strike="noStrike" cap="none" dirty="0" err="1">
+                <a:solidFill>
+                  <a:srgbClr val="000000"/>
+                </a:solidFill>
+                <a:effectLst/>
+                <a:latin typeface="Arial"/>
+                <a:ea typeface="Arial"/>
+                <a:cs typeface="Arial"/>
+                <a:sym typeface="Arial"/>
+              </a:rPr>
+              <a:t>imformation</a:t>
+            </a:r>
+            <a:r>
+              <a:rPr lang="en-US" altLang="zh-CN" sz="1100" b="0" i="0" u="none" strike="noStrike" cap="none" dirty="0">
+                <a:solidFill>
+                  <a:srgbClr val="000000"/>
+                </a:solidFill>
+                <a:effectLst/>
+                <a:latin typeface="Arial"/>
+                <a:ea typeface="Arial"/>
+                <a:cs typeface="Arial"/>
+                <a:sym typeface="Arial"/>
+              </a:rPr>
+              <a:t> coming from, this is coming from the array itself. </a:t>
+            </a:r>
+          </a:p>
+          <a:p>
+            <a:pPr marL="139700" indent="0">
+              <a:buNone/>
+            </a:pPr>
+            <a:r>
+              <a:rPr lang="en-US" altLang="zh-CN" sz="1100" b="0" i="0" u="none" strike="noStrike" cap="none" dirty="0">
+                <a:solidFill>
+                  <a:srgbClr val="000000"/>
+                </a:solidFill>
+                <a:effectLst/>
+                <a:latin typeface="Arial"/>
+                <a:ea typeface="Arial"/>
+                <a:cs typeface="Arial"/>
+                <a:sym typeface="Arial"/>
+              </a:rPr>
+              <a:t>And going to be stored </a:t>
+            </a:r>
+            <a:r>
+              <a:rPr lang="en-US" altLang="zh-CN" sz="1100" b="0" i="0" u="none" strike="noStrike" cap="none" dirty="0" err="1">
+                <a:solidFill>
+                  <a:srgbClr val="000000"/>
+                </a:solidFill>
+                <a:effectLst/>
+                <a:latin typeface="Arial"/>
+                <a:ea typeface="Arial"/>
+                <a:cs typeface="Arial"/>
+                <a:sym typeface="Arial"/>
+              </a:rPr>
+              <a:t>temperaly</a:t>
+            </a:r>
+            <a:r>
+              <a:rPr lang="en-US" altLang="zh-CN" sz="1100" b="0" i="0" u="none" strike="noStrike" cap="none" dirty="0">
+                <a:solidFill>
+                  <a:srgbClr val="000000"/>
+                </a:solidFill>
+                <a:effectLst/>
+                <a:latin typeface="Arial"/>
+                <a:ea typeface="Arial"/>
+                <a:cs typeface="Arial"/>
+                <a:sym typeface="Arial"/>
+              </a:rPr>
+              <a:t> in a </a:t>
+            </a:r>
+            <a:r>
+              <a:rPr lang="en-US" altLang="zh-CN" sz="1100" b="0" i="0" u="none" strike="noStrike" cap="none" dirty="0" err="1">
+                <a:solidFill>
+                  <a:srgbClr val="000000"/>
+                </a:solidFill>
+                <a:effectLst/>
+                <a:latin typeface="Arial"/>
+                <a:ea typeface="Arial"/>
+                <a:cs typeface="Arial"/>
+                <a:sym typeface="Arial"/>
+              </a:rPr>
+              <a:t>a</a:t>
+            </a:r>
+            <a:r>
+              <a:rPr lang="en-US" altLang="zh-CN" sz="1100" b="0" i="0" u="none" strike="noStrike" cap="none" dirty="0">
+                <a:solidFill>
+                  <a:srgbClr val="000000"/>
+                </a:solidFill>
+                <a:effectLst/>
+                <a:latin typeface="Arial"/>
+                <a:ea typeface="Arial"/>
+                <a:cs typeface="Arial"/>
+                <a:sym typeface="Arial"/>
+              </a:rPr>
+              <a:t> variable. </a:t>
+            </a:r>
+          </a:p>
+          <a:p>
+            <a:pPr marL="139700" indent="0">
+              <a:buNone/>
+            </a:pPr>
+            <a:r>
+              <a:rPr lang="en-US" altLang="zh-CN" sz="1100" b="0" i="0" u="none" strike="noStrike" cap="none" dirty="0">
+                <a:solidFill>
+                  <a:srgbClr val="000000"/>
+                </a:solidFill>
+                <a:effectLst/>
+                <a:latin typeface="Arial"/>
+                <a:ea typeface="Arial"/>
+                <a:cs typeface="Arial"/>
+                <a:sym typeface="Arial"/>
+              </a:rPr>
+              <a:t>Where command is to define condition that must be met to be able to put into the new collection result which is a </a:t>
+            </a:r>
+            <a:r>
+              <a:rPr lang="en-US" altLang="zh-CN" sz="1100" b="0" i="0" u="none" strike="noStrike" cap="none" dirty="0" err="1">
+                <a:solidFill>
+                  <a:srgbClr val="000000"/>
+                </a:solidFill>
+                <a:effectLst/>
+                <a:latin typeface="Arial"/>
+                <a:ea typeface="Arial"/>
+                <a:cs typeface="Arial"/>
+                <a:sym typeface="Arial"/>
+              </a:rPr>
+              <a:t>orderedenumberable</a:t>
+            </a:r>
+            <a:endParaRPr lang="en-US" altLang="zh-CN" sz="1100" b="0" i="0" u="none" strike="noStrike" cap="none" dirty="0">
+              <a:solidFill>
+                <a:srgbClr val="000000"/>
+              </a:solidFill>
+              <a:effectLst/>
+              <a:latin typeface="Arial"/>
+              <a:ea typeface="Arial"/>
+              <a:cs typeface="Arial"/>
+              <a:sym typeface="Arial"/>
+            </a:endParaRPr>
+          </a:p>
+          <a:p>
+            <a:pPr marL="139700" indent="0">
+              <a:buNone/>
+            </a:pPr>
+            <a:r>
+              <a:rPr lang="en-US" altLang="zh-CN" sz="1100" b="0" i="0" u="none" strike="noStrike" cap="none" dirty="0" err="1">
+                <a:solidFill>
+                  <a:srgbClr val="000000"/>
+                </a:solidFill>
+                <a:effectLst/>
+                <a:latin typeface="Arial"/>
+                <a:ea typeface="Arial"/>
+                <a:cs typeface="Arial"/>
+                <a:sym typeface="Arial"/>
+              </a:rPr>
+              <a:t>Orderby</a:t>
+            </a:r>
+            <a:r>
+              <a:rPr lang="en-US" altLang="zh-CN" sz="1100" b="0" i="0" u="none" strike="noStrike" cap="none" dirty="0">
+                <a:solidFill>
+                  <a:srgbClr val="000000"/>
+                </a:solidFill>
+                <a:effectLst/>
+                <a:latin typeface="Arial"/>
+                <a:ea typeface="Arial"/>
+                <a:cs typeface="Arial"/>
+                <a:sym typeface="Arial"/>
+              </a:rPr>
+              <a:t> command is to determine what data we are going to order by which way, </a:t>
+            </a:r>
+            <a:r>
+              <a:rPr lang="en-US" altLang="zh-CN" sz="1100" b="0" i="0" u="none" strike="noStrike" cap="none" dirty="0" err="1">
+                <a:solidFill>
+                  <a:srgbClr val="000000"/>
+                </a:solidFill>
+                <a:effectLst/>
+                <a:latin typeface="Arial"/>
+                <a:ea typeface="Arial"/>
+                <a:cs typeface="Arial"/>
+                <a:sym typeface="Arial"/>
+              </a:rPr>
+              <a:t>decending</a:t>
+            </a:r>
+            <a:r>
+              <a:rPr lang="en-US" altLang="zh-CN" sz="1100" b="0" i="0" u="none" strike="noStrike" cap="none" dirty="0">
+                <a:solidFill>
+                  <a:srgbClr val="000000"/>
+                </a:solidFill>
+                <a:effectLst/>
+                <a:latin typeface="Arial"/>
+                <a:ea typeface="Arial"/>
+                <a:cs typeface="Arial"/>
+                <a:sym typeface="Arial"/>
+              </a:rPr>
+              <a:t> or </a:t>
+            </a:r>
+            <a:r>
+              <a:rPr lang="en-US" altLang="zh-CN" sz="1100" b="0" i="0" u="none" strike="noStrike" cap="none" dirty="0" err="1">
+                <a:solidFill>
+                  <a:srgbClr val="000000"/>
+                </a:solidFill>
+                <a:effectLst/>
+                <a:latin typeface="Arial"/>
+                <a:ea typeface="Arial"/>
+                <a:cs typeface="Arial"/>
+                <a:sym typeface="Arial"/>
+              </a:rPr>
+              <a:t>assending</a:t>
+            </a:r>
+            <a:r>
+              <a:rPr lang="en-US" altLang="zh-CN" sz="1100" b="0" i="0" u="none" strike="noStrike" cap="none" dirty="0">
+                <a:solidFill>
+                  <a:srgbClr val="000000"/>
+                </a:solidFill>
+                <a:effectLst/>
+                <a:latin typeface="Arial"/>
+                <a:ea typeface="Arial"/>
+                <a:cs typeface="Arial"/>
+                <a:sym typeface="Arial"/>
+              </a:rPr>
+              <a:t>. </a:t>
+            </a:r>
+          </a:p>
+          <a:p>
+            <a:pPr marL="139700" indent="0">
+              <a:buNone/>
+            </a:pPr>
+            <a:r>
+              <a:rPr lang="en-US" altLang="zh-CN" sz="1100" b="0" i="0" u="none" strike="noStrike" cap="none" dirty="0">
+                <a:solidFill>
+                  <a:srgbClr val="000000"/>
+                </a:solidFill>
+                <a:effectLst/>
+                <a:latin typeface="Arial"/>
+                <a:ea typeface="Arial"/>
+                <a:cs typeface="Arial"/>
+                <a:sym typeface="Arial"/>
+              </a:rPr>
+              <a:t>Select defines the </a:t>
+            </a:r>
+            <a:r>
+              <a:rPr lang="en-US" altLang="zh-CN" sz="1100" b="0" i="0" u="none" strike="noStrike" cap="none" dirty="0" err="1">
+                <a:solidFill>
+                  <a:srgbClr val="000000"/>
+                </a:solidFill>
+                <a:effectLst/>
+                <a:latin typeface="Arial"/>
+                <a:ea typeface="Arial"/>
+                <a:cs typeface="Arial"/>
+                <a:sym typeface="Arial"/>
+              </a:rPr>
+              <a:t>varable</a:t>
+            </a:r>
+            <a:r>
+              <a:rPr lang="en-US" altLang="zh-CN" sz="1100" b="0" i="0" u="none" strike="noStrike" cap="none" dirty="0">
+                <a:solidFill>
+                  <a:srgbClr val="000000"/>
+                </a:solidFill>
+                <a:effectLst/>
+                <a:latin typeface="Arial"/>
+                <a:ea typeface="Arial"/>
+                <a:cs typeface="Arial"/>
+                <a:sym typeface="Arial"/>
+              </a:rPr>
+              <a:t> which met these conditions, and generate a new collection. Which assign to the result </a:t>
+            </a:r>
+            <a:r>
+              <a:rPr lang="en-US" altLang="zh-CN" sz="1100" b="0" i="0" u="none" strike="noStrike" cap="none" dirty="0" err="1">
+                <a:solidFill>
+                  <a:srgbClr val="000000"/>
+                </a:solidFill>
+                <a:effectLst/>
+                <a:latin typeface="Arial"/>
+                <a:ea typeface="Arial"/>
+                <a:cs typeface="Arial"/>
+                <a:sym typeface="Arial"/>
+              </a:rPr>
+              <a:t>varable</a:t>
+            </a:r>
+            <a:r>
+              <a:rPr lang="en-US" altLang="zh-CN" sz="1100" b="0" i="0" u="none" strike="noStrike" cap="none" dirty="0">
+                <a:solidFill>
+                  <a:srgbClr val="000000"/>
+                </a:solidFill>
+                <a:effectLst/>
+                <a:latin typeface="Arial"/>
+                <a:ea typeface="Arial"/>
+                <a:cs typeface="Arial"/>
+                <a:sym typeface="Arial"/>
+              </a:rPr>
+              <a:t>. </a:t>
+            </a:r>
+          </a:p>
+          <a:p>
             <a:r>
               <a:rPr lang="en-US" altLang="zh-CN" sz="1100" b="0" i="0" u="none" strike="noStrike" cap="none" dirty="0">
                 <a:solidFill>
@@ -1560,7 +1950,7 @@
               </a:spcAft>
               <a:buNone/>
             </a:pPr>
-            <a:endParaRPr/>
+            <a:endParaRPr dirty="0"/>
           </a:p>
         </p:txBody>
       </p:sp>
@@ -6022,7 +6412,7 @@
             </a:pPr>
             <a:r>
               <a:rPr lang="en-US" altLang="zh-CN" sz="1400" dirty="0"/>
-              <a:t>Managed &amp; Unmanaged Source</a:t>
+              <a:t>Managed &amp; Unmanaged Memory</a:t>
             </a:r>
           </a:p>
           <a:p>
@@ -8228,7 +8618,7 @@
         <p:spPr>
           <a:xfrm>
             <a:off x="1484852" y="1744602"/>
-            <a:ext cx="5339591" cy="584775"/>
+            <a:ext cx="5339591" cy="830997"/>
           </a:xfrm>
           <a:prstGeom prst="rect">
             <a:avLst/>
@@ -8251,6 +8641,15 @@
               </a:rPr>
               <a:t>Relational Database -&gt; SQL(Structured Query Language)</a:t>
             </a:r>
+          </a:p>
+          <a:p>
+            <a:endParaRPr lang="en-US" altLang="zh-CN" sz="1600" dirty="0">
+              <a:solidFill>
+                <a:schemeClr val="tx2">
+                  <a:lumMod val="50000"/>
+                </a:schemeClr>
+              </a:solidFill>
+            </a:endParaRPr>
           </a:p>
           <a:p>
             <a:r>
@@ -8288,7 +8687,7 @@
         <p:spPr>
           <a:xfrm>
             <a:off x="1451296" y="2533523"/>
-            <a:ext cx="5205271" cy="461665"/>
+            <a:ext cx="4366901" cy="461665"/>
           </a:xfrm>
           <a:prstGeom prst="rect">
             <a:avLst/>
@@ -8309,7 +8708,7 @@
                   </a:schemeClr>
                 </a:solidFill>
               </a:rPr>
-              <a:t>LINQ Query -&gt;  Various Data Source</a:t>
+              <a:t>LINQ  -&gt;  Various Data Source</a:t>
             </a:r>
             <a:endParaRPr lang="zh-CN" altLang="en-US" sz="2400" dirty="0">
               <a:solidFill>
@@ -8923,7 +9322,7 @@
         </p:blipFill>
         <p:spPr>
           <a:xfrm>
-            <a:off x="2000313" y="654476"/>
+            <a:off x="2045898" y="538670"/>
             <a:ext cx="3880370" cy="4066160"/>
           </a:xfrm>
           <a:prstGeom prst="rect">

</xml_diff>